<commit_message>
Versión final por mi parte.
Falta revisión javi
</commit_message>
<xml_diff>
--- a/NPI- Práctica 3.pptx
+++ b/NPI- Práctica 3.pptx
@@ -14,9 +14,10 @@
     <p:sldId id="263" r:id="rId8"/>
     <p:sldId id="264" r:id="rId9"/>
     <p:sldId id="267" r:id="rId10"/>
-    <p:sldId id="265" r:id="rId11"/>
-    <p:sldId id="266" r:id="rId12"/>
-    <p:sldId id="256" r:id="rId13"/>
+    <p:sldId id="268" r:id="rId11"/>
+    <p:sldId id="265" r:id="rId12"/>
+    <p:sldId id="266" r:id="rId13"/>
+    <p:sldId id="256" r:id="rId14"/>
   </p:sldIdLst>
   <p:sldSz cx="9144000" cy="6858000" type="screen4x3"/>
   <p:notesSz cx="6858000" cy="9144000"/>
@@ -255,7 +256,8 @@
           <a:p>
             <a:fld id="{2C1EE710-F46E-4A11-9E26-AAEA4D324068}" type="datetimeFigureOut">
               <a:rPr lang="es-ES" smtClean="0"/>
-              <a:t>05/01/2015</a:t>
+              <a:pPr/>
+              <a:t>06/01/2015</a:t>
             </a:fld>
             <a:endParaRPr lang="es-ES"/>
           </a:p>
@@ -1001,6 +1003,7 @@
           <a:p>
             <a:fld id="{285FBA62-36F6-4B39-8C1C-CA82301BE597}" type="slidenum">
               <a:rPr lang="es-ES" smtClean="0"/>
+              <a:pPr/>
               <a:t>‹Nº›</a:t>
             </a:fld>
             <a:endParaRPr lang="es-ES"/>
@@ -1124,7 +1127,8 @@
           <a:p>
             <a:fld id="{2C1EE710-F46E-4A11-9E26-AAEA4D324068}" type="datetimeFigureOut">
               <a:rPr lang="es-ES" smtClean="0"/>
-              <a:t>05/01/2015</a:t>
+              <a:pPr/>
+              <a:t>06/01/2015</a:t>
             </a:fld>
             <a:endParaRPr lang="es-ES"/>
           </a:p>
@@ -1166,6 +1170,7 @@
           <a:p>
             <a:fld id="{285FBA62-36F6-4B39-8C1C-CA82301BE597}" type="slidenum">
               <a:rPr lang="es-ES" smtClean="0"/>
+              <a:pPr/>
               <a:t>‹Nº›</a:t>
             </a:fld>
             <a:endParaRPr lang="es-ES"/>
@@ -1299,7 +1304,8 @@
           <a:p>
             <a:fld id="{2C1EE710-F46E-4A11-9E26-AAEA4D324068}" type="datetimeFigureOut">
               <a:rPr lang="es-ES" smtClean="0"/>
-              <a:t>05/01/2015</a:t>
+              <a:pPr/>
+              <a:t>06/01/2015</a:t>
             </a:fld>
             <a:endParaRPr lang="es-ES"/>
           </a:p>
@@ -1341,6 +1347,7 @@
           <a:p>
             <a:fld id="{285FBA62-36F6-4B39-8C1C-CA82301BE597}" type="slidenum">
               <a:rPr lang="es-ES" smtClean="0"/>
+              <a:pPr/>
               <a:t>‹Nº›</a:t>
             </a:fld>
             <a:endParaRPr lang="es-ES"/>
@@ -1469,7 +1476,8 @@
           <a:p>
             <a:fld id="{2C1EE710-F46E-4A11-9E26-AAEA4D324068}" type="datetimeFigureOut">
               <a:rPr lang="es-ES" smtClean="0"/>
-              <a:t>05/01/2015</a:t>
+              <a:pPr/>
+              <a:t>06/01/2015</a:t>
             </a:fld>
             <a:endParaRPr lang="es-ES"/>
           </a:p>
@@ -1492,6 +1500,7 @@
           <a:p>
             <a:fld id="{285FBA62-36F6-4B39-8C1C-CA82301BE597}" type="slidenum">
               <a:rPr lang="es-ES" smtClean="0"/>
+              <a:pPr/>
               <a:t>‹Nº›</a:t>
             </a:fld>
             <a:endParaRPr lang="es-ES"/>
@@ -1679,7 +1688,8 @@
           <a:p>
             <a:fld id="{2C1EE710-F46E-4A11-9E26-AAEA4D324068}" type="datetimeFigureOut">
               <a:rPr lang="es-ES" smtClean="0"/>
-              <a:t>05/01/2015</a:t>
+              <a:pPr/>
+              <a:t>06/01/2015</a:t>
             </a:fld>
             <a:endParaRPr lang="es-ES"/>
           </a:p>
@@ -2422,6 +2432,7 @@
           <a:p>
             <a:fld id="{285FBA62-36F6-4B39-8C1C-CA82301BE597}" type="slidenum">
               <a:rPr lang="es-ES" smtClean="0"/>
+              <a:pPr/>
               <a:t>‹Nº›</a:t>
             </a:fld>
             <a:endParaRPr lang="es-ES"/>
@@ -2493,7 +2504,8 @@
           <a:p>
             <a:fld id="{2C1EE710-F46E-4A11-9E26-AAEA4D324068}" type="datetimeFigureOut">
               <a:rPr lang="es-ES" smtClean="0"/>
-              <a:t>05/01/2015</a:t>
+              <a:pPr/>
+              <a:t>06/01/2015</a:t>
             </a:fld>
             <a:endParaRPr lang="es-ES"/>
           </a:p>
@@ -2535,6 +2547,7 @@
           <a:p>
             <a:fld id="{285FBA62-36F6-4B39-8C1C-CA82301BE597}" type="slidenum">
               <a:rPr lang="es-ES" smtClean="0"/>
+              <a:pPr/>
               <a:t>‹Nº›</a:t>
             </a:fld>
             <a:endParaRPr lang="es-ES"/>
@@ -2729,7 +2742,8 @@
           <a:p>
             <a:fld id="{2C1EE710-F46E-4A11-9E26-AAEA4D324068}" type="datetimeFigureOut">
               <a:rPr lang="es-ES" smtClean="0"/>
-              <a:t>05/01/2015</a:t>
+              <a:pPr/>
+              <a:t>06/01/2015</a:t>
             </a:fld>
             <a:endParaRPr lang="es-ES"/>
           </a:p>
@@ -2771,6 +2785,7 @@
           <a:p>
             <a:fld id="{285FBA62-36F6-4B39-8C1C-CA82301BE597}" type="slidenum">
               <a:rPr lang="es-ES" smtClean="0"/>
+              <a:pPr/>
               <a:t>‹Nº›</a:t>
             </a:fld>
             <a:endParaRPr lang="es-ES"/>
@@ -3052,7 +3067,8 @@
           <a:p>
             <a:fld id="{2C1EE710-F46E-4A11-9E26-AAEA4D324068}" type="datetimeFigureOut">
               <a:rPr lang="es-ES" smtClean="0"/>
-              <a:t>05/01/2015</a:t>
+              <a:pPr/>
+              <a:t>06/01/2015</a:t>
             </a:fld>
             <a:endParaRPr lang="es-ES"/>
           </a:p>
@@ -3075,6 +3091,7 @@
           <a:p>
             <a:fld id="{285FBA62-36F6-4B39-8C1C-CA82301BE597}" type="slidenum">
               <a:rPr lang="es-ES" smtClean="0"/>
+              <a:pPr/>
               <a:t>‹Nº›</a:t>
             </a:fld>
             <a:endParaRPr lang="es-ES"/>
@@ -3142,7 +3159,8 @@
           <a:p>
             <a:fld id="{2C1EE710-F46E-4A11-9E26-AAEA4D324068}" type="datetimeFigureOut">
               <a:rPr lang="es-ES" smtClean="0"/>
-              <a:t>05/01/2015</a:t>
+              <a:pPr/>
+              <a:t>06/01/2015</a:t>
             </a:fld>
             <a:endParaRPr lang="es-ES"/>
           </a:p>
@@ -3184,6 +3202,7 @@
           <a:p>
             <a:fld id="{285FBA62-36F6-4B39-8C1C-CA82301BE597}" type="slidenum">
               <a:rPr lang="es-ES" smtClean="0"/>
+              <a:pPr/>
               <a:t>‹Nº›</a:t>
             </a:fld>
             <a:endParaRPr lang="es-ES"/>
@@ -3659,7 +3678,8 @@
           <a:p>
             <a:fld id="{2C1EE710-F46E-4A11-9E26-AAEA4D324068}" type="datetimeFigureOut">
               <a:rPr lang="es-ES" smtClean="0"/>
-              <a:t>05/01/2015</a:t>
+              <a:pPr/>
+              <a:t>06/01/2015</a:t>
             </a:fld>
             <a:endParaRPr lang="es-ES"/>
           </a:p>
@@ -3682,6 +3702,7 @@
           <a:p>
             <a:fld id="{285FBA62-36F6-4B39-8C1C-CA82301BE597}" type="slidenum">
               <a:rPr lang="es-ES" smtClean="0"/>
+              <a:pPr/>
               <a:t>‹Nº›</a:t>
             </a:fld>
             <a:endParaRPr lang="es-ES"/>
@@ -4170,7 +4191,8 @@
           <a:p>
             <a:fld id="{2C1EE710-F46E-4A11-9E26-AAEA4D324068}" type="datetimeFigureOut">
               <a:rPr lang="es-ES" smtClean="0"/>
-              <a:t>05/01/2015</a:t>
+              <a:pPr/>
+              <a:t>06/01/2015</a:t>
             </a:fld>
             <a:endParaRPr lang="es-ES"/>
           </a:p>
@@ -4193,6 +4215,7 @@
           <a:p>
             <a:fld id="{285FBA62-36F6-4B39-8C1C-CA82301BE597}" type="slidenum">
               <a:rPr lang="es-ES" smtClean="0"/>
+              <a:pPr/>
               <a:t>‹Nº›</a:t>
             </a:fld>
             <a:endParaRPr lang="es-ES"/>
@@ -4415,7 +4438,8 @@
           <a:p>
             <a:fld id="{2C1EE710-F46E-4A11-9E26-AAEA4D324068}" type="datetimeFigureOut">
               <a:rPr lang="es-ES" smtClean="0"/>
-              <a:t>05/01/2015</a:t>
+              <a:pPr/>
+              <a:t>06/01/2015</a:t>
             </a:fld>
             <a:endParaRPr lang="es-ES"/>
           </a:p>
@@ -4691,6 +4715,7 @@
           <a:p>
             <a:fld id="{285FBA62-36F6-4B39-8C1C-CA82301BE597}" type="slidenum">
               <a:rPr lang="es-ES" smtClean="0"/>
+              <a:pPr/>
               <a:t>‹Nº›</a:t>
             </a:fld>
             <a:endParaRPr lang="es-ES"/>
@@ -5152,7 +5177,7 @@
         </p:nvSpPr>
         <p:spPr>
           <a:xfrm>
-            <a:off x="395536" y="188640"/>
+            <a:off x="395536" y="-315416"/>
             <a:ext cx="7467600" cy="1143000"/>
           </a:xfrm>
         </p:spPr>
@@ -5170,25 +5195,155 @@
             </a:r>
             <a:r>
               <a:rPr lang="es-ES" dirty="0" smtClean="0"/>
-              <a:t> de prueba (</a:t>
-            </a:r>
-            <a:r>
-              <a:rPr lang="es-ES" dirty="0" smtClean="0"/>
-              <a:t>VI)</a:t>
+              <a:t> de prueba (VI)</a:t>
             </a:r>
             <a:endParaRPr lang="es-ES" dirty="0"/>
           </a:p>
         </p:txBody>
       </p:sp>
-      <p:sp>
-        <p:nvSpPr>
-          <p:cNvPr id="3" name="2 Marcador de contenido"/>
-          <p:cNvSpPr>
-            <a:spLocks noGrp="1"/>
-          </p:cNvSpPr>
+      <p:pic>
+        <p:nvPicPr>
+          <p:cNvPr id="3074" name="Picture 2"/>
+          <p:cNvPicPr>
+            <a:picLocks noChangeAspect="1" noChangeArrowheads="1"/>
+          </p:cNvPicPr>
+          <p:nvPr/>
+        </p:nvPicPr>
+        <p:blipFill>
+          <a:blip r:embed="rId2" cstate="print"/>
+          <a:srcRect/>
+          <a:stretch>
+            <a:fillRect/>
+          </a:stretch>
+        </p:blipFill>
+        <p:spPr bwMode="auto">
+          <a:xfrm>
+            <a:off x="539552" y="836712"/>
+            <a:ext cx="7848872" cy="5184576"/>
+          </a:xfrm>
+          <a:prstGeom prst="rect">
+            <a:avLst/>
+          </a:prstGeom>
+          <a:noFill/>
+          <a:ln w="9525">
+            <a:noFill/>
+            <a:miter lim="800000"/>
+            <a:headEnd/>
+            <a:tailEnd/>
+          </a:ln>
+        </p:spPr>
+      </p:pic>
+      <p:pic>
+        <p:nvPicPr>
+          <p:cNvPr id="3076" name="Picture 4"/>
+          <p:cNvPicPr>
+            <a:picLocks noGrp="1" noChangeAspect="1" noChangeArrowheads="1"/>
+          </p:cNvPicPr>
           <p:nvPr>
             <p:ph sz="quarter" idx="1"/>
           </p:nvPr>
+        </p:nvPicPr>
+        <p:blipFill>
+          <a:blip r:embed="rId3" cstate="print"/>
+          <a:srcRect/>
+          <a:stretch>
+            <a:fillRect/>
+          </a:stretch>
+        </p:blipFill>
+        <p:spPr bwMode="auto">
+          <a:xfrm>
+            <a:off x="611560" y="6165304"/>
+            <a:ext cx="2847975" cy="200025"/>
+          </a:xfrm>
+          <a:prstGeom prst="rect">
+            <a:avLst/>
+          </a:prstGeom>
+          <a:noFill/>
+          <a:ln w="9525">
+            <a:noFill/>
+            <a:miter lim="800000"/>
+            <a:headEnd/>
+            <a:tailEnd/>
+          </a:ln>
+        </p:spPr>
+      </p:pic>
+    </p:spTree>
+  </p:cSld>
+  <p:clrMapOvr>
+    <a:masterClrMapping/>
+  </p:clrMapOvr>
+  <p:timing>
+    <p:tnLst>
+      <p:par>
+        <p:cTn id="1" dur="indefinite" restart="never" nodeType="tmRoot"/>
+      </p:par>
+    </p:tnLst>
+  </p:timing>
+</p:sld>
+</file>
+
+<file path=ppt/slides/slide11.xml><?xml version="1.0" encoding="utf-8"?>
+<p:sld xmlns:a="http://schemas.openxmlformats.org/drawingml/2006/main" xmlns:r="http://schemas.openxmlformats.org/officeDocument/2006/relationships" xmlns:p="http://schemas.openxmlformats.org/presentationml/2006/main">
+  <p:cSld>
+    <p:spTree>
+      <p:nvGrpSpPr>
+        <p:cNvPr id="1" name=""/>
+        <p:cNvGrpSpPr/>
+        <p:nvPr/>
+      </p:nvGrpSpPr>
+      <p:grpSpPr>
+        <a:xfrm>
+          <a:off x="0" y="0"/>
+          <a:ext cx="0" cy="0"/>
+          <a:chOff x="0" y="0"/>
+          <a:chExt cx="0" cy="0"/>
+        </a:xfrm>
+      </p:grpSpPr>
+      <p:sp>
+        <p:nvSpPr>
+          <p:cNvPr id="2" name="1 Título"/>
+          <p:cNvSpPr>
+            <a:spLocks noGrp="1"/>
+          </p:cNvSpPr>
+          <p:nvPr>
+            <p:ph type="title"/>
+          </p:nvPr>
+        </p:nvSpPr>
+        <p:spPr>
+          <a:xfrm>
+            <a:off x="395536" y="188640"/>
+            <a:ext cx="7467600" cy="1143000"/>
+          </a:xfrm>
+        </p:spPr>
+        <p:txBody>
+          <a:bodyPr/>
+          <a:lstStyle/>
+          <a:p>
+            <a:r>
+              <a:rPr lang="es-ES" dirty="0" smtClean="0"/>
+              <a:t>Creación de </a:t>
+            </a:r>
+            <a:r>
+              <a:rPr lang="es-ES" dirty="0" err="1" smtClean="0"/>
+              <a:t>apk</a:t>
+            </a:r>
+            <a:r>
+              <a:rPr lang="es-ES" dirty="0" smtClean="0"/>
+              <a:t> de prueba (VI)</a:t>
+            </a:r>
+            <a:endParaRPr lang="es-ES" dirty="0"/>
+          </a:p>
+        </p:txBody>
+      </p:sp>
+      <p:sp>
+        <p:nvSpPr>
+          <p:cNvPr id="3" name="2 Marcador de contenido"/>
+          <p:cNvSpPr>
+            <a:spLocks noGrp="1"/>
+          </p:cNvSpPr>
+          <p:nvPr>
+            <p:ph sz="quarter" idx="1"/>
+          </p:nvPr>
         </p:nvSpPr>
         <p:spPr>
           <a:xfrm>
@@ -5204,13 +5359,8 @@
           <a:p>
             <a:r>
               <a:rPr lang="es-ES" dirty="0" smtClean="0"/>
-              <a:t>Quinto paso. Prueba de la </a:t>
-            </a:r>
-            <a:r>
-              <a:rPr lang="es-ES" dirty="0" smtClean="0"/>
-              <a:t>aplicación</a:t>
-            </a:r>
-            <a:endParaRPr lang="es-ES" dirty="0" smtClean="0"/>
+              <a:t>Quinto paso. Prueba de la aplicación</a:t>
+            </a:r>
           </a:p>
           <a:p>
             <a:endParaRPr lang="es-ES" dirty="0" smtClean="0"/>
@@ -5240,7 +5390,7 @@
         </p:blipFill>
         <p:spPr>
           <a:xfrm>
-            <a:off x="2987824" y="1844824"/>
+            <a:off x="755576" y="1844824"/>
             <a:ext cx="3456384" cy="4733744"/>
           </a:xfrm>
           <a:prstGeom prst="rect">
@@ -5248,6 +5398,260 @@
           </a:prstGeom>
         </p:spPr>
       </p:pic>
+      <p:sp>
+        <p:nvSpPr>
+          <p:cNvPr id="6" name="2 Marcador de contenido"/>
+          <p:cNvSpPr txBox="1">
+            <a:spLocks/>
+          </p:cNvSpPr>
+          <p:nvPr/>
+        </p:nvSpPr>
+        <p:spPr>
+          <a:xfrm>
+            <a:off x="4283968" y="1844824"/>
+            <a:ext cx="4104456" cy="4536504"/>
+          </a:xfrm>
+          <a:prstGeom prst="rect">
+            <a:avLst/>
+          </a:prstGeom>
+        </p:spPr>
+        <p:txBody>
+          <a:bodyPr vert="horz">
+            <a:normAutofit/>
+          </a:bodyPr>
+          <a:lstStyle/>
+          <a:p>
+            <a:pPr marL="274320" marR="0" lvl="0" indent="-274320" algn="l" defTabSz="914400" rtl="0" eaLnBrk="1" fontAlgn="auto" latinLnBrk="0" hangingPunct="1">
+              <a:lnSpc>
+                <a:spcPct val="100000"/>
+              </a:lnSpc>
+              <a:spcBef>
+                <a:spcPts val="600"/>
+              </a:spcBef>
+              <a:spcAft>
+                <a:spcPts val="0"/>
+              </a:spcAft>
+              <a:buClr>
+                <a:schemeClr val="accent1"/>
+              </a:buClr>
+              <a:buSzPct val="70000"/>
+              <a:buFont typeface="Wingdings"/>
+              <a:buChar char=""/>
+              <a:tabLst/>
+              <a:defRPr/>
+            </a:pPr>
+            <a:r>
+              <a:rPr lang="es-ES" sz="2400" dirty="0" smtClean="0"/>
+              <a:t>La aplicación reconoce números del 0-9. Si pones dos números consecutivos los suma automática y da el resultado. Si pintas un espiral la aplicación termina.</a:t>
+            </a:r>
+          </a:p>
+          <a:p>
+            <a:pPr marL="274320" marR="0" lvl="0" indent="-274320" algn="l" defTabSz="914400" rtl="0" eaLnBrk="1" fontAlgn="auto" latinLnBrk="0" hangingPunct="1">
+              <a:lnSpc>
+                <a:spcPct val="100000"/>
+              </a:lnSpc>
+              <a:spcBef>
+                <a:spcPts val="600"/>
+              </a:spcBef>
+              <a:spcAft>
+                <a:spcPts val="0"/>
+              </a:spcAft>
+              <a:buClr>
+                <a:schemeClr val="accent1"/>
+              </a:buClr>
+              <a:buSzPct val="70000"/>
+              <a:buFont typeface="Wingdings"/>
+              <a:buChar char=""/>
+              <a:tabLst/>
+              <a:defRPr/>
+            </a:pPr>
+            <a:endParaRPr kumimoji="0" lang="es-ES" sz="2400" b="0" i="0" u="none" strike="noStrike" kern="1200" cap="none" spc="0" normalizeH="0" baseline="0" noProof="0" dirty="0" smtClean="0">
+              <a:ln>
+                <a:noFill/>
+              </a:ln>
+              <a:solidFill>
+                <a:schemeClr val="tx1"/>
+              </a:solidFill>
+              <a:effectLst/>
+              <a:uLnTx/>
+              <a:uFillTx/>
+              <a:latin typeface="+mn-lt"/>
+              <a:ea typeface="+mn-ea"/>
+              <a:cs typeface="+mn-cs"/>
+            </a:endParaRPr>
+          </a:p>
+          <a:p>
+            <a:pPr marL="274320" marR="0" lvl="0" indent="-274320" algn="l" defTabSz="914400" rtl="0" eaLnBrk="1" fontAlgn="auto" latinLnBrk="0" hangingPunct="1">
+              <a:lnSpc>
+                <a:spcPct val="100000"/>
+              </a:lnSpc>
+              <a:spcBef>
+                <a:spcPts val="600"/>
+              </a:spcBef>
+              <a:spcAft>
+                <a:spcPts val="0"/>
+              </a:spcAft>
+              <a:buClr>
+                <a:schemeClr val="accent1"/>
+              </a:buClr>
+              <a:buSzPct val="70000"/>
+              <a:buFont typeface="Wingdings"/>
+              <a:buChar char=""/>
+              <a:tabLst/>
+              <a:defRPr/>
+            </a:pPr>
+            <a:r>
+              <a:rPr kumimoji="0" lang="es-ES" sz="2400" b="0" i="0" u="none" strike="noStrike" kern="1200" cap="none" spc="0" normalizeH="0" baseline="0" noProof="0" dirty="0" smtClean="0">
+                <a:ln>
+                  <a:noFill/>
+                </a:ln>
+                <a:solidFill>
+                  <a:schemeClr val="tx1"/>
+                </a:solidFill>
+                <a:effectLst/>
+                <a:uLnTx/>
+                <a:uFillTx/>
+                <a:latin typeface="+mn-lt"/>
+                <a:ea typeface="+mn-ea"/>
+                <a:cs typeface="+mn-cs"/>
+              </a:rPr>
+              <a:t>Enlace GITHUB</a:t>
+            </a:r>
+            <a:br>
+              <a:rPr kumimoji="0" lang="es-ES" sz="2400" b="0" i="0" u="none" strike="noStrike" kern="1200" cap="none" spc="0" normalizeH="0" baseline="0" noProof="0" dirty="0" smtClean="0">
+                <a:ln>
+                  <a:noFill/>
+                </a:ln>
+                <a:solidFill>
+                  <a:schemeClr val="tx1"/>
+                </a:solidFill>
+                <a:effectLst/>
+                <a:uLnTx/>
+                <a:uFillTx/>
+                <a:latin typeface="+mn-lt"/>
+                <a:ea typeface="+mn-ea"/>
+                <a:cs typeface="+mn-cs"/>
+              </a:rPr>
+            </a:br>
+            <a:r>
+              <a:rPr lang="es-ES" sz="2400" dirty="0" smtClean="0">
+                <a:hlinkClick r:id="rId4"/>
+              </a:rPr>
+              <a:t>https</a:t>
+            </a:r>
+            <a:r>
+              <a:rPr lang="es-ES" sz="2400" dirty="0" smtClean="0">
+                <a:hlinkClick r:id="rId4"/>
+              </a:rPr>
+              <a:t>://</a:t>
+            </a:r>
+            <a:r>
+              <a:rPr lang="es-ES" sz="2400" dirty="0" smtClean="0">
+                <a:hlinkClick r:id="rId4"/>
+              </a:rPr>
+              <a:t>github.com/Jick9536/NPI-P3</a:t>
+            </a:r>
+            <a:endParaRPr lang="es-ES" sz="2400" dirty="0" smtClean="0"/>
+          </a:p>
+          <a:p>
+            <a:pPr marL="274320" lvl="0" indent="-274320">
+              <a:spcBef>
+                <a:spcPts val="600"/>
+              </a:spcBef>
+              <a:buClr>
+                <a:schemeClr val="accent1"/>
+              </a:buClr>
+              <a:buSzPct val="70000"/>
+              <a:buFont typeface="Wingdings"/>
+              <a:buChar char=""/>
+            </a:pPr>
+            <a:endParaRPr kumimoji="0" lang="es-ES" sz="2400" b="0" i="0" u="none" strike="noStrike" kern="1200" cap="none" spc="0" normalizeH="0" baseline="0" noProof="0" dirty="0" smtClean="0">
+              <a:ln>
+                <a:noFill/>
+              </a:ln>
+              <a:solidFill>
+                <a:schemeClr val="tx1"/>
+              </a:solidFill>
+              <a:effectLst/>
+              <a:uLnTx/>
+              <a:uFillTx/>
+              <a:latin typeface="+mn-lt"/>
+              <a:ea typeface="+mn-ea"/>
+              <a:cs typeface="+mn-cs"/>
+            </a:endParaRPr>
+          </a:p>
+          <a:p>
+            <a:pPr marL="274320" marR="0" lvl="0" indent="-274320" algn="l" defTabSz="914400" rtl="0" eaLnBrk="1" fontAlgn="auto" latinLnBrk="0" hangingPunct="1">
+              <a:lnSpc>
+                <a:spcPct val="100000"/>
+              </a:lnSpc>
+              <a:spcBef>
+                <a:spcPts val="600"/>
+              </a:spcBef>
+              <a:spcAft>
+                <a:spcPts val="0"/>
+              </a:spcAft>
+              <a:buClr>
+                <a:schemeClr val="accent1"/>
+              </a:buClr>
+              <a:buSzPct val="70000"/>
+              <a:buFont typeface="Wingdings"/>
+              <a:buChar char=""/>
+              <a:tabLst/>
+              <a:defRPr/>
+            </a:pPr>
+            <a:endParaRPr kumimoji="0" lang="es-ES" sz="2400" b="0" i="0" u="none" strike="noStrike" kern="1200" cap="none" spc="0" normalizeH="0" baseline="0" noProof="0" dirty="0" smtClean="0">
+              <a:ln>
+                <a:noFill/>
+              </a:ln>
+              <a:solidFill>
+                <a:schemeClr val="tx1"/>
+              </a:solidFill>
+              <a:effectLst/>
+              <a:uLnTx/>
+              <a:uFillTx/>
+              <a:latin typeface="+mn-lt"/>
+              <a:ea typeface="+mn-ea"/>
+              <a:cs typeface="+mn-cs"/>
+            </a:endParaRPr>
+          </a:p>
+          <a:p>
+            <a:pPr marL="274320" marR="0" lvl="0" indent="-274320" algn="l" defTabSz="914400" rtl="0" eaLnBrk="1" fontAlgn="auto" latinLnBrk="0" hangingPunct="1">
+              <a:lnSpc>
+                <a:spcPct val="100000"/>
+              </a:lnSpc>
+              <a:spcBef>
+                <a:spcPts val="600"/>
+              </a:spcBef>
+              <a:spcAft>
+                <a:spcPts val="0"/>
+              </a:spcAft>
+              <a:buClr>
+                <a:schemeClr val="accent1"/>
+              </a:buClr>
+              <a:buSzPct val="70000"/>
+              <a:buFont typeface="Wingdings"/>
+              <a:buChar char=""/>
+              <a:tabLst/>
+              <a:defRPr/>
+            </a:pPr>
+            <a:endParaRPr kumimoji="0" lang="es-ES" sz="2400" b="0" i="0" u="none" strike="noStrike" kern="1200" cap="none" spc="0" normalizeH="0" baseline="0" noProof="0" dirty="0">
+              <a:ln>
+                <a:noFill/>
+              </a:ln>
+              <a:solidFill>
+                <a:schemeClr val="tx1"/>
+              </a:solidFill>
+              <a:effectLst/>
+              <a:uLnTx/>
+              <a:uFillTx/>
+              <a:latin typeface="+mn-lt"/>
+              <a:ea typeface="+mn-ea"/>
+              <a:cs typeface="+mn-cs"/>
+            </a:endParaRPr>
+          </a:p>
+        </p:txBody>
+      </p:sp>
     </p:spTree>
   </p:cSld>
   <p:clrMapOvr>
@@ -5348,136 +5752,6 @@
 </p:sld>
 </file>
 
-<file path=ppt/slides/slide11.xml><?xml version="1.0" encoding="utf-8"?>
-<p:sld xmlns:a="http://schemas.openxmlformats.org/drawingml/2006/main" xmlns:r="http://schemas.openxmlformats.org/officeDocument/2006/relationships" xmlns:p="http://schemas.openxmlformats.org/presentationml/2006/main">
-  <p:cSld>
-    <p:spTree>
-      <p:nvGrpSpPr>
-        <p:cNvPr id="1" name=""/>
-        <p:cNvGrpSpPr/>
-        <p:nvPr/>
-      </p:nvGrpSpPr>
-      <p:grpSpPr>
-        <a:xfrm>
-          <a:off x="0" y="0"/>
-          <a:ext cx="0" cy="0"/>
-          <a:chOff x="0" y="0"/>
-          <a:chExt cx="0" cy="0"/>
-        </a:xfrm>
-      </p:grpSpPr>
-      <p:sp>
-        <p:nvSpPr>
-          <p:cNvPr id="2" name="1 Título"/>
-          <p:cNvSpPr>
-            <a:spLocks noGrp="1"/>
-          </p:cNvSpPr>
-          <p:nvPr>
-            <p:ph type="title"/>
-          </p:nvPr>
-        </p:nvSpPr>
-        <p:spPr/>
-        <p:txBody>
-          <a:bodyPr/>
-          <a:lstStyle/>
-          <a:p>
-            <a:r>
-              <a:rPr lang="es-ES" dirty="0" smtClean="0"/>
-              <a:t>Problemas encontrados</a:t>
-            </a:r>
-            <a:endParaRPr lang="es-ES" dirty="0"/>
-          </a:p>
-        </p:txBody>
-      </p:sp>
-      <p:sp>
-        <p:nvSpPr>
-          <p:cNvPr id="3" name="2 Marcador de contenido"/>
-          <p:cNvSpPr>
-            <a:spLocks noGrp="1"/>
-          </p:cNvSpPr>
-          <p:nvPr>
-            <p:ph sz="quarter" idx="1"/>
-          </p:nvPr>
-        </p:nvSpPr>
-        <p:spPr/>
-        <p:txBody>
-          <a:bodyPr/>
-          <a:lstStyle/>
-          <a:p>
-            <a:r>
-              <a:rPr lang="es-ES" dirty="0" smtClean="0"/>
-              <a:t>La predicción por defecto 1.0 es muy baja hay que ajustarla bien para cada tipo de dispositivo si no se quiere que se reconozcan varios gestos simultáneamente.</a:t>
-            </a:r>
-          </a:p>
-          <a:p>
-            <a:endParaRPr lang="es-ES" dirty="0" smtClean="0"/>
-          </a:p>
-          <a:p>
-            <a:r>
-              <a:rPr lang="es-ES" dirty="0" smtClean="0"/>
-              <a:t> Los gestos tienen que hacerse en un solo trazo. Aunque </a:t>
-            </a:r>
-            <a:r>
-              <a:rPr lang="es-ES" dirty="0" err="1" smtClean="0"/>
-              <a:t>gesture</a:t>
-            </a:r>
-            <a:r>
-              <a:rPr lang="es-ES" dirty="0" smtClean="0"/>
-              <a:t> </a:t>
-            </a:r>
-            <a:r>
-              <a:rPr lang="es-ES" dirty="0" err="1" smtClean="0"/>
-              <a:t>tool</a:t>
-            </a:r>
-            <a:r>
-              <a:rPr lang="es-ES" dirty="0" smtClean="0"/>
-              <a:t> que permite hacer gestos múltiples a la hora de hacer el ejemplo sólo reconoce un solo trazo. Error solucionado añadiendo </a:t>
-            </a:r>
-            <a:r>
-              <a:rPr lang="es-ES" dirty="0" err="1" smtClean="0"/>
-              <a:t>android:gestureStrokeType</a:t>
-            </a:r>
-            <a:r>
-              <a:rPr lang="es-ES" dirty="0" smtClean="0"/>
-              <a:t>=</a:t>
-            </a:r>
-            <a:r>
-              <a:rPr lang="es-ES" i="1" dirty="0" smtClean="0"/>
-              <a:t>"</a:t>
-            </a:r>
-            <a:r>
-              <a:rPr lang="es-ES" i="1" dirty="0" err="1" smtClean="0"/>
-              <a:t>multiple</a:t>
-            </a:r>
-            <a:r>
-              <a:rPr lang="es-ES" i="1" dirty="0" smtClean="0"/>
-              <a:t>" </a:t>
-            </a:r>
-            <a:r>
-              <a:rPr lang="es-ES" i="1" dirty="0" smtClean="0"/>
-              <a:t> </a:t>
-            </a:r>
-            <a:r>
-              <a:rPr lang="es-ES" dirty="0" smtClean="0"/>
-              <a:t>en el </a:t>
-            </a:r>
-          </a:p>
-        </p:txBody>
-      </p:sp>
-    </p:spTree>
-  </p:cSld>
-  <p:clrMapOvr>
-    <a:masterClrMapping/>
-  </p:clrMapOvr>
-  <p:timing>
-    <p:tnLst>
-      <p:par>
-        <p:cTn id="1" dur="indefinite" restart="never" nodeType="tmRoot"/>
-      </p:par>
-    </p:tnLst>
-  </p:timing>
-</p:sld>
-</file>
-
 <file path=ppt/slides/slide12.xml><?xml version="1.0" encoding="utf-8"?>
 <p:sld xmlns:a="http://schemas.openxmlformats.org/drawingml/2006/main" xmlns:r="http://schemas.openxmlformats.org/officeDocument/2006/relationships" xmlns:p="http://schemas.openxmlformats.org/presentationml/2006/main">
   <p:cSld>
@@ -5502,6 +5776,155 @@
             <a:spLocks noGrp="1"/>
           </p:cNvSpPr>
           <p:nvPr>
+            <p:ph type="title"/>
+          </p:nvPr>
+        </p:nvSpPr>
+        <p:spPr/>
+        <p:txBody>
+          <a:bodyPr/>
+          <a:lstStyle/>
+          <a:p>
+            <a:r>
+              <a:rPr lang="es-ES" dirty="0" smtClean="0"/>
+              <a:t>Problemas encontrados</a:t>
+            </a:r>
+            <a:endParaRPr lang="es-ES" dirty="0"/>
+          </a:p>
+        </p:txBody>
+      </p:sp>
+      <p:sp>
+        <p:nvSpPr>
+          <p:cNvPr id="3" name="2 Marcador de contenido"/>
+          <p:cNvSpPr>
+            <a:spLocks noGrp="1"/>
+          </p:cNvSpPr>
+          <p:nvPr>
+            <p:ph sz="quarter" idx="1"/>
+          </p:nvPr>
+        </p:nvSpPr>
+        <p:spPr/>
+        <p:txBody>
+          <a:bodyPr>
+            <a:normAutofit/>
+          </a:bodyPr>
+          <a:lstStyle/>
+          <a:p>
+            <a:r>
+              <a:rPr lang="es-ES" dirty="0" smtClean="0"/>
+              <a:t>La predicción por defecto 1.0 es muy baja hay que ajustarla bien para cada tipo de dispositivo si no se quiere que se reconozcan varios gestos simultáneamente</a:t>
+            </a:r>
+            <a:r>
+              <a:rPr lang="es-ES" dirty="0" smtClean="0"/>
+              <a:t>.</a:t>
+            </a:r>
+            <a:br>
+              <a:rPr lang="es-ES" dirty="0" smtClean="0"/>
+            </a:br>
+            <a:r>
+              <a:rPr lang="es-ES" dirty="0" smtClean="0"/>
+              <a:t> </a:t>
+            </a:r>
+          </a:p>
+          <a:p>
+            <a:pPr fontAlgn="base"/>
+            <a:r>
+              <a:rPr lang="es-ES" dirty="0" smtClean="0"/>
+              <a:t>Los </a:t>
+            </a:r>
+            <a:r>
+              <a:rPr lang="es-ES" dirty="0" smtClean="0"/>
+              <a:t>gestos tienen que hacerse en un solo trazo. Aunque </a:t>
+            </a:r>
+            <a:r>
+              <a:rPr lang="es-ES" dirty="0" err="1" smtClean="0"/>
+              <a:t>gesture</a:t>
+            </a:r>
+            <a:r>
+              <a:rPr lang="es-ES" dirty="0" smtClean="0"/>
+              <a:t> </a:t>
+            </a:r>
+            <a:r>
+              <a:rPr lang="es-ES" dirty="0" err="1" smtClean="0"/>
+              <a:t>tool</a:t>
+            </a:r>
+            <a:r>
+              <a:rPr lang="es-ES" dirty="0" smtClean="0"/>
+              <a:t> que permite hacer gestos múltiples a la hora de hacer el ejemplo sólo reconoce un solo trazo. Este problema debería poder solucionarse añadiendo </a:t>
+            </a:r>
+            <a:r>
+              <a:rPr lang="en-US" dirty="0" smtClean="0"/>
+              <a:t> </a:t>
+            </a:r>
+            <a:r>
+              <a:rPr lang="en-US" dirty="0" err="1" smtClean="0"/>
+              <a:t>android:gestureStrokeType</a:t>
+            </a:r>
+            <a:r>
+              <a:rPr lang="en-US" dirty="0" smtClean="0"/>
+              <a:t>="multiple”</a:t>
+            </a:r>
+            <a:br>
+              <a:rPr lang="en-US" dirty="0" smtClean="0"/>
+            </a:br>
+            <a:r>
+              <a:rPr lang="en-US" dirty="0" smtClean="0"/>
+              <a:t>y </a:t>
+            </a:r>
+            <a:r>
+              <a:rPr lang="en-US" dirty="0" err="1" smtClean="0"/>
+              <a:t>android:fadeOffset</a:t>
+            </a:r>
+            <a:r>
+              <a:rPr lang="en-US" dirty="0" smtClean="0"/>
+              <a:t>="800"/ en el xml</a:t>
+            </a:r>
+            <a:endParaRPr lang="es-ES" dirty="0" smtClean="0"/>
+          </a:p>
+          <a:p>
+            <a:pPr algn="just" fontAlgn="base"/>
+            <a:endParaRPr lang="en-US" dirty="0" smtClean="0"/>
+          </a:p>
+        </p:txBody>
+      </p:sp>
+    </p:spTree>
+  </p:cSld>
+  <p:clrMapOvr>
+    <a:masterClrMapping/>
+  </p:clrMapOvr>
+  <p:timing>
+    <p:tnLst>
+      <p:par>
+        <p:cTn id="1" dur="indefinite" restart="never" nodeType="tmRoot"/>
+      </p:par>
+    </p:tnLst>
+  </p:timing>
+</p:sld>
+</file>
+
+<file path=ppt/slides/slide13.xml><?xml version="1.0" encoding="utf-8"?>
+<p:sld xmlns:a="http://schemas.openxmlformats.org/drawingml/2006/main" xmlns:r="http://schemas.openxmlformats.org/officeDocument/2006/relationships" xmlns:p="http://schemas.openxmlformats.org/presentationml/2006/main">
+  <p:cSld>
+    <p:spTree>
+      <p:nvGrpSpPr>
+        <p:cNvPr id="1" name=""/>
+        <p:cNvGrpSpPr/>
+        <p:nvPr/>
+      </p:nvGrpSpPr>
+      <p:grpSpPr>
+        <a:xfrm>
+          <a:off x="0" y="0"/>
+          <a:ext cx="0" cy="0"/>
+          <a:chOff x="0" y="0"/>
+          <a:chExt cx="0" cy="0"/>
+        </a:xfrm>
+      </p:grpSpPr>
+      <p:sp>
+        <p:nvSpPr>
+          <p:cNvPr id="2" name="1 Título"/>
+          <p:cNvSpPr>
+            <a:spLocks noGrp="1"/>
+          </p:cNvSpPr>
+          <p:nvPr>
             <p:ph type="ctrTitle"/>
           </p:nvPr>
         </p:nvSpPr>
@@ -5640,18 +6063,7 @@
                 </a:solidFill>
                 <a:hlinkClick r:id="rId5"/>
               </a:rPr>
-              <a:t>http://</a:t>
-            </a:r>
-            <a:r>
-              <a:rPr lang="es-ES" sz="2200" dirty="0" smtClean="0">
-                <a:solidFill>
-                  <a:schemeClr val="tx1">
-                    <a:tint val="75000"/>
-                  </a:schemeClr>
-                </a:solidFill>
-                <a:hlinkClick r:id="rId5"/>
-              </a:rPr>
-              <a:t>www.youtube.com/watch?v=mW9r7hXi8mk</a:t>
+              <a:t>http://www.youtube.com/watch?v=mW9r7hXi8mk</a:t>
             </a:r>
             <a:endParaRPr lang="es-ES" sz="2200" dirty="0" smtClean="0">
               <a:solidFill>
@@ -5711,18 +6123,7 @@
                 </a:solidFill>
                 <a:hlinkClick r:id="rId6"/>
               </a:rPr>
-              <a:t>https://</a:t>
-            </a:r>
-            <a:r>
-              <a:rPr lang="es-ES" sz="2200" dirty="0" smtClean="0">
-                <a:solidFill>
-                  <a:schemeClr val="tx1">
-                    <a:tint val="75000"/>
-                  </a:schemeClr>
-                </a:solidFill>
-                <a:hlinkClick r:id="rId6"/>
-              </a:rPr>
-              <a:t>gitorious.org/g2l-gesture-launcher/g2l-gesture </a:t>
+              <a:t>https://gitorious.org/g2l-gesture-launcher/g2l-gesture </a:t>
             </a:r>
             <a:r>
               <a:rPr lang="es-ES" sz="2200" dirty="0" err="1" smtClean="0">
@@ -5787,18 +6188,7 @@
                 </a:solidFill>
                 <a:hlinkClick r:id="rId7"/>
               </a:rPr>
-              <a:t>http://www.youtube.com/watch?v=-</a:t>
-            </a:r>
-            <a:r>
-              <a:rPr lang="es-ES" sz="2200" dirty="0" smtClean="0">
-                <a:solidFill>
-                  <a:schemeClr val="tx1">
-                    <a:tint val="75000"/>
-                  </a:schemeClr>
-                </a:solidFill>
-                <a:hlinkClick r:id="rId7"/>
-              </a:rPr>
-              <a:t>lZazZPbaP8</a:t>
+              <a:t>http://www.youtube.com/watch?v=-lZazZPbaP8</a:t>
             </a:r>
             <a:endParaRPr lang="es-ES" sz="2200" dirty="0" smtClean="0">
               <a:solidFill>
@@ -5839,13 +6229,7 @@
               <a:rPr lang="es-ES" sz="2200" dirty="0" smtClean="0">
                 <a:hlinkClick r:id="rId8"/>
               </a:rPr>
-              <a:t>http://</a:t>
-            </a:r>
-            <a:r>
-              <a:rPr lang="es-ES" sz="2200" dirty="0" smtClean="0">
-                <a:hlinkClick r:id="rId8"/>
-              </a:rPr>
-              <a:t>www.youtube.com/watch?v=V-jUvLj3J9E</a:t>
+              <a:t>http://www.youtube.com/watch?v=V-jUvLj3J9E</a:t>
             </a:r>
             <a:endParaRPr lang="es-ES" sz="2200" dirty="0" smtClean="0"/>
           </a:p>
@@ -5862,13 +6246,7 @@
               <a:rPr lang="es-ES" sz="2200" dirty="0" smtClean="0">
                 <a:hlinkClick r:id="rId9"/>
               </a:rPr>
-              <a:t>https://</a:t>
-            </a:r>
-            <a:r>
-              <a:rPr lang="es-ES" sz="2200" dirty="0" smtClean="0">
-                <a:hlinkClick r:id="rId9"/>
-              </a:rPr>
-              <a:t>www.youtube.com/watch?v=2QsyXtqVAEw#action=share</a:t>
+              <a:t>https://www.youtube.com/watch?v=2QsyXtqVAEw#action=share</a:t>
             </a:r>
             <a:endParaRPr lang="es-ES" sz="2200" dirty="0" smtClean="0"/>
           </a:p>
@@ -6519,33 +6897,21 @@
             <a:pPr lvl="1"/>
             <a:r>
               <a:rPr lang="es-ES" dirty="0" smtClean="0"/>
-              <a:t>Dibujar gestos </a:t>
-            </a:r>
-            <a:r>
-              <a:rPr lang="es-ES" dirty="0" smtClean="0"/>
-              <a:t>nuevos</a:t>
+              <a:t>Dibujar gestos nuevos</a:t>
             </a:r>
           </a:p>
           <a:p>
             <a:pPr lvl="1"/>
             <a:r>
               <a:rPr lang="es-ES" dirty="0" smtClean="0"/>
-              <a:t>Almacenar </a:t>
-            </a:r>
-            <a:r>
-              <a:rPr lang="es-ES" dirty="0" smtClean="0"/>
-              <a:t>gestos</a:t>
+              <a:t>Almacenar gestos</a:t>
             </a:r>
           </a:p>
           <a:p>
             <a:pPr lvl="1"/>
             <a:r>
               <a:rPr lang="es-ES" dirty="0" smtClean="0"/>
-              <a:t>Cargar </a:t>
-            </a:r>
-            <a:r>
-              <a:rPr lang="es-ES" dirty="0" smtClean="0"/>
-              <a:t>gestos</a:t>
+              <a:t>Cargar gestos</a:t>
             </a:r>
           </a:p>
           <a:p>
@@ -6553,10 +6919,6 @@
             <a:r>
               <a:rPr lang="es-ES" dirty="0" smtClean="0"/>
               <a:t>Reconocer gestos</a:t>
-            </a:r>
-            <a:r>
-              <a:rPr lang="es-ES" dirty="0" smtClean="0"/>
-              <a:t/>
             </a:r>
             <a:br>
               <a:rPr lang="es-ES" dirty="0" smtClean="0"/>
@@ -6721,23 +7083,13 @@
             </a:r>
             <a:r>
               <a:rPr lang="es-ES" dirty="0" smtClean="0"/>
-              <a:t> esta permite crear nuestros </a:t>
-            </a:r>
-            <a:r>
-              <a:rPr lang="es-ES" dirty="0" smtClean="0"/>
-              <a:t>gestos personalizados </a:t>
+              <a:t> esta permite crear nuestros gestos personalizados </a:t>
             </a:r>
             <a:r>
               <a:rPr lang="es-ES" dirty="0" smtClean="0">
                 <a:hlinkClick r:id="rId3"/>
               </a:rPr>
-              <a:t>https://</a:t>
-            </a:r>
-            <a:r>
-              <a:rPr lang="es-ES" dirty="0" smtClean="0">
-                <a:hlinkClick r:id="rId3"/>
-              </a:rPr>
-              <a:t>play.google.com/store/apps/details?id=com.davemac327.gesture.tool&amp;hl=es</a:t>
+              <a:t>https://play.google.com/store/apps/details?id=com.davemac327.gesture.tool&amp;hl=es</a:t>
             </a:r>
             <a:endParaRPr lang="es-ES" dirty="0" smtClean="0"/>
           </a:p>
@@ -6766,7 +7118,6 @@
               <a:rPr lang="es-ES" dirty="0" smtClean="0"/>
               <a:t> . De esta manera se podrá usar para buscar coincidencias con nuestros gestos personalizados.</a:t>
             </a:r>
-            <a:endParaRPr lang="es-ES" dirty="0" smtClean="0"/>
           </a:p>
           <a:p>
             <a:endParaRPr lang="es-ES" dirty="0" smtClean="0"/>
@@ -6975,13 +7326,7 @@
               <a:rPr lang="es-ES" dirty="0" smtClean="0">
                 <a:hlinkClick r:id="rId2"/>
               </a:rPr>
-              <a:t>https://</a:t>
-            </a:r>
-            <a:r>
-              <a:rPr lang="es-ES" dirty="0" smtClean="0">
-                <a:hlinkClick r:id="rId2"/>
-              </a:rPr>
-              <a:t>play.google.com/store/apps/details?id=com.davemac327.gesture.tool&amp;hl=es</a:t>
+              <a:t>https://play.google.com/store/apps/details?id=com.davemac327.gesture.tool&amp;hl=es</a:t>
             </a:r>
             <a:endParaRPr lang="es-ES" dirty="0" smtClean="0"/>
           </a:p>
@@ -7070,11 +7415,7 @@
             </a:r>
             <a:r>
               <a:rPr lang="es-ES" dirty="0" smtClean="0"/>
-              <a:t> de prueba </a:t>
-            </a:r>
-            <a:r>
-              <a:rPr lang="es-ES" dirty="0" smtClean="0"/>
-              <a:t>(II)</a:t>
+              <a:t> de prueba (II)</a:t>
             </a:r>
             <a:endParaRPr lang="es-ES" dirty="0"/>
           </a:p>
@@ -7266,11 +7607,7 @@
             </a:r>
             <a:r>
               <a:rPr lang="es-ES" dirty="0" smtClean="0"/>
-              <a:t> de prueba (</a:t>
-            </a:r>
-            <a:r>
-              <a:rPr lang="es-ES" dirty="0" smtClean="0"/>
-              <a:t>III)</a:t>
+              <a:t> de prueba (III)</a:t>
             </a:r>
             <a:endParaRPr lang="es-ES" dirty="0"/>
           </a:p>
@@ -7314,11 +7651,7 @@
             <a:pPr lvl="2"/>
             <a:r>
               <a:rPr lang="es-ES" dirty="0" smtClean="0"/>
-              <a:t>En nuestro caso hemos guardo un gesto por cada número </a:t>
-            </a:r>
-            <a:r>
-              <a:rPr lang="es-ES" dirty="0" smtClean="0"/>
-              <a:t>0-9 y un gesto para la salida</a:t>
+              <a:t>En nuestro caso hemos guardo un gesto por cada número 0-9 y un gesto para la salida</a:t>
             </a:r>
           </a:p>
           <a:p>
@@ -7491,11 +7824,7 @@
             </a:r>
             <a:r>
               <a:rPr lang="es-ES" dirty="0" smtClean="0"/>
-              <a:t> de prueba (</a:t>
-            </a:r>
-            <a:r>
-              <a:rPr lang="es-ES" dirty="0" smtClean="0"/>
-              <a:t>IV)</a:t>
+              <a:t> de prueba (IV)</a:t>
             </a:r>
             <a:endParaRPr lang="es-ES" dirty="0"/>
           </a:p>
@@ -7520,31 +7849,7 @@
           <a:p>
             <a:r>
               <a:rPr lang="es-ES" dirty="0" smtClean="0"/>
-              <a:t>Tercer </a:t>
-            </a:r>
-            <a:r>
-              <a:rPr lang="es-ES" dirty="0" smtClean="0"/>
-              <a:t>paso: </a:t>
-            </a:r>
-            <a:r>
-              <a:rPr lang="es-ES" dirty="0" smtClean="0"/>
-              <a:t>Inclusión </a:t>
-            </a:r>
-            <a:r>
-              <a:rPr lang="es-ES" dirty="0" smtClean="0"/>
-              <a:t>de </a:t>
-            </a:r>
-            <a:r>
-              <a:rPr lang="es-ES" dirty="0" smtClean="0"/>
-              <a:t>librerías en el </a:t>
-            </a:r>
-            <a:r>
-              <a:rPr lang="es-ES" dirty="0" smtClean="0"/>
-              <a:t>proyecto.</a:t>
-            </a:r>
-            <a:r>
-              <a:rPr lang="es-ES" dirty="0" smtClean="0"/>
-              <a:t/>
+              <a:t>Tercer paso: Inclusión de librerías en el proyecto.</a:t>
             </a:r>
             <a:br>
               <a:rPr lang="es-ES" dirty="0" smtClean="0"/>
@@ -7680,13 +7985,7 @@
               <a:rPr lang="es-ES" dirty="0" smtClean="0">
                 <a:hlinkClick r:id="rId2"/>
               </a:rPr>
-              <a:t>http://</a:t>
-            </a:r>
-            <a:r>
-              <a:rPr lang="es-ES" dirty="0" smtClean="0">
-                <a:hlinkClick r:id="rId2"/>
-              </a:rPr>
-              <a:t>developer.android.com/reference/android/gesture/package-summary.html</a:t>
+              <a:t>http://developer.android.com/reference/android/gesture/package-summary.html</a:t>
             </a:r>
             <a:r>
               <a:rPr lang="es-ES" dirty="0" smtClean="0"/>
@@ -7769,6 +8068,38 @@
           <a:chExt cx="0" cy="0"/>
         </a:xfrm>
       </p:grpSpPr>
+      <p:pic>
+        <p:nvPicPr>
+          <p:cNvPr id="1027" name="Picture 3"/>
+          <p:cNvPicPr>
+            <a:picLocks noChangeAspect="1" noChangeArrowheads="1"/>
+          </p:cNvPicPr>
+          <p:nvPr/>
+        </p:nvPicPr>
+        <p:blipFill>
+          <a:blip r:embed="rId2" cstate="print"/>
+          <a:srcRect/>
+          <a:stretch>
+            <a:fillRect/>
+          </a:stretch>
+        </p:blipFill>
+        <p:spPr bwMode="auto">
+          <a:xfrm>
+            <a:off x="1331640" y="2636912"/>
+            <a:ext cx="5543550" cy="2981325"/>
+          </a:xfrm>
+          <a:prstGeom prst="rect">
+            <a:avLst/>
+          </a:prstGeom>
+          <a:noFill/>
+          <a:ln w="9525">
+            <a:noFill/>
+            <a:miter lim="800000"/>
+            <a:headEnd/>
+            <a:tailEnd/>
+          </a:ln>
+        </p:spPr>
+      </p:pic>
       <p:sp>
         <p:nvSpPr>
           <p:cNvPr id="2" name="1 Título"/>
@@ -7794,19 +8125,7 @@
             </a:r>
             <a:r>
               <a:rPr lang="es-ES" dirty="0" smtClean="0"/>
-              <a:t> de prueba </a:t>
-            </a:r>
-            <a:r>
-              <a:rPr lang="es-ES" dirty="0" smtClean="0"/>
-              <a:t>(</a:t>
-            </a:r>
-            <a:r>
-              <a:rPr lang="es-ES" dirty="0" smtClean="0"/>
-              <a:t>V</a:t>
-            </a:r>
-            <a:r>
-              <a:rPr lang="es-ES" dirty="0" smtClean="0"/>
-              <a:t>)</a:t>
+              <a:t> de prueba (V)</a:t>
             </a:r>
             <a:endParaRPr lang="es-ES" dirty="0"/>
           </a:p>
@@ -7822,27 +8141,41 @@
             <p:ph sz="quarter" idx="1"/>
           </p:nvPr>
         </p:nvSpPr>
-        <p:spPr/>
-        <p:txBody>
-          <a:bodyPr/>
-          <a:lstStyle/>
-          <a:p>
-            <a:r>
-              <a:rPr lang="es-ES" dirty="0" smtClean="0"/>
-              <a:t>Cuarto </a:t>
-            </a:r>
-            <a:r>
-              <a:rPr lang="es-ES" dirty="0" smtClean="0"/>
-              <a:t>paso: Definición </a:t>
-            </a:r>
-            <a:r>
-              <a:rPr lang="es-ES" dirty="0" smtClean="0"/>
-              <a:t>de constructores y métodos en la aplicación</a:t>
+        <p:spPr>
+          <a:xfrm>
+            <a:off x="457200" y="1600200"/>
+            <a:ext cx="7467600" cy="5069160"/>
+          </a:xfrm>
+        </p:spPr>
+        <p:txBody>
+          <a:bodyPr>
+            <a:normAutofit fontScale="85000" lnSpcReduction="20000"/>
+          </a:bodyPr>
+          <a:lstStyle/>
+          <a:p>
+            <a:r>
+              <a:rPr lang="es-ES" dirty="0" smtClean="0"/>
+              <a:t>Cuarto paso: Definición de constructores y métodos en la aplicación</a:t>
             </a:r>
             <a:r>
               <a:rPr lang="es-ES" dirty="0" smtClean="0"/>
               <a:t>.</a:t>
             </a:r>
+          </a:p>
+          <a:p>
+            <a:pPr lvl="1"/>
+            <a:r>
+              <a:rPr lang="es-ES" dirty="0" smtClean="0"/>
+              <a:t>Res/</a:t>
+            </a:r>
+            <a:r>
+              <a:rPr lang="es-ES" dirty="0" err="1" smtClean="0"/>
+              <a:t>layout</a:t>
+            </a:r>
+            <a:r>
+              <a:rPr lang="es-ES" dirty="0" smtClean="0"/>
+              <a:t>/activity_main_activity2.xml</a:t>
+            </a:r>
             <a:r>
               <a:rPr lang="es-ES" dirty="0" smtClean="0"/>
               <a:t/>
@@ -7850,6 +8183,156 @@
             <a:br>
               <a:rPr lang="es-ES" dirty="0" smtClean="0"/>
             </a:br>
+            <a:endParaRPr lang="es-ES" dirty="0" smtClean="0"/>
+          </a:p>
+          <a:p>
+            <a:pPr lvl="1"/>
+            <a:endParaRPr lang="es-ES" dirty="0" smtClean="0"/>
+          </a:p>
+          <a:p>
+            <a:pPr lvl="1"/>
+            <a:endParaRPr lang="es-ES" dirty="0" smtClean="0"/>
+          </a:p>
+          <a:p>
+            <a:pPr lvl="1"/>
+            <a:endParaRPr lang="es-ES" dirty="0" smtClean="0"/>
+          </a:p>
+          <a:p>
+            <a:pPr lvl="1"/>
+            <a:endParaRPr lang="es-ES" dirty="0" smtClean="0"/>
+          </a:p>
+          <a:p>
+            <a:pPr lvl="1"/>
+            <a:endParaRPr lang="es-ES" dirty="0" smtClean="0"/>
+          </a:p>
+          <a:p>
+            <a:pPr lvl="1"/>
+            <a:endParaRPr lang="es-ES" dirty="0" smtClean="0"/>
+          </a:p>
+          <a:p>
+            <a:pPr lvl="1"/>
+            <a:endParaRPr lang="es-ES" dirty="0" smtClean="0"/>
+          </a:p>
+          <a:p>
+            <a:pPr lvl="1">
+              <a:buNone/>
+            </a:pPr>
+            <a:r>
+              <a:rPr lang="es-ES" b="1" dirty="0" smtClean="0"/>
+              <a:t> </a:t>
+            </a:r>
+            <a:endParaRPr lang="es-ES" b="1" dirty="0" smtClean="0"/>
+          </a:p>
+          <a:p>
+            <a:pPr lvl="1"/>
+            <a:endParaRPr lang="es-ES" b="1" dirty="0" smtClean="0"/>
+          </a:p>
+          <a:p>
+            <a:pPr lvl="1"/>
+            <a:endParaRPr lang="es-ES" dirty="0" smtClean="0"/>
+          </a:p>
+          <a:p>
+            <a:pPr lvl="1"/>
+            <a:endParaRPr lang="es-ES" dirty="0" smtClean="0"/>
+          </a:p>
+          <a:p>
+            <a:pPr lvl="1"/>
+            <a:r>
+              <a:rPr lang="es-ES" dirty="0" smtClean="0"/>
+              <a:t>Tenemos </a:t>
+            </a:r>
+            <a:r>
+              <a:rPr lang="es-ES" dirty="0" err="1" smtClean="0"/>
+              <a:t>un</a:t>
+            </a:r>
+            <a:r>
+              <a:rPr lang="es-ES" i="1" dirty="0" err="1" smtClean="0"/>
+              <a:t>layout</a:t>
+            </a:r>
+            <a:r>
+              <a:rPr lang="es-ES" dirty="0" smtClean="0"/>
+              <a:t> </a:t>
+            </a:r>
+            <a:r>
+              <a:rPr lang="es-ES" dirty="0" smtClean="0"/>
+              <a:t> </a:t>
+            </a:r>
+            <a:r>
+              <a:rPr lang="es-ES" dirty="0" smtClean="0"/>
+              <a:t>formado por un </a:t>
+            </a:r>
+            <a:r>
+              <a:rPr lang="es-ES" dirty="0" err="1" smtClean="0"/>
+              <a:t>LinearLayout</a:t>
+            </a:r>
+            <a:r>
+              <a:rPr lang="es-ES" dirty="0" smtClean="0"/>
+              <a:t> que contiene: un </a:t>
+            </a:r>
+            <a:r>
+              <a:rPr lang="es-ES" dirty="0" err="1" smtClean="0"/>
+              <a:t>TextView</a:t>
+            </a:r>
+            <a:r>
+              <a:rPr lang="es-ES" dirty="0" smtClean="0"/>
+              <a:t> con un </a:t>
+            </a:r>
+            <a:r>
+              <a:rPr lang="es-ES" dirty="0" smtClean="0"/>
+              <a:t>título</a:t>
+            </a:r>
+            <a:r>
+              <a:rPr lang="es-ES" dirty="0" smtClean="0"/>
+              <a:t> </a:t>
+            </a:r>
+            <a:r>
+              <a:rPr lang="es-ES" dirty="0" smtClean="0"/>
+              <a:t>y</a:t>
+            </a:r>
+            <a:r>
+              <a:rPr lang="es-ES" dirty="0" smtClean="0"/>
+              <a:t> un </a:t>
+            </a:r>
+            <a:r>
+              <a:rPr lang="es-ES" dirty="0" err="1" smtClean="0"/>
+              <a:t>GestureOverlayView</a:t>
+            </a:r>
+            <a:r>
+              <a:rPr lang="es-ES" dirty="0" smtClean="0"/>
+              <a:t> para la </a:t>
+            </a:r>
+            <a:r>
+              <a:rPr lang="es-ES" dirty="0" smtClean="0"/>
+              <a:t>salida </a:t>
+            </a:r>
+            <a:r>
+              <a:rPr lang="es-ES" dirty="0" smtClean="0"/>
+              <a:t>del programa. </a:t>
+            </a:r>
+            <a:r>
+              <a:rPr lang="es-ES" dirty="0" err="1" smtClean="0"/>
+              <a:t>GestureStrokeType</a:t>
+            </a:r>
+            <a:r>
+              <a:rPr lang="es-ES" dirty="0" smtClean="0"/>
+              <a:t> permite varios trazos y </a:t>
+            </a:r>
+            <a:r>
+              <a:rPr lang="es-ES" dirty="0" err="1" smtClean="0"/>
+              <a:t>fadeoffset</a:t>
+            </a:r>
+            <a:r>
+              <a:rPr lang="es-ES" dirty="0" smtClean="0"/>
+              <a:t> es el tiempo entre gestos </a:t>
+            </a:r>
+            <a:r>
+              <a:rPr lang="es-ES" dirty="0" err="1" smtClean="0"/>
+              <a:t>multiples</a:t>
+            </a:r>
+            <a:r>
+              <a:rPr lang="es-ES" dirty="0" smtClean="0"/>
+              <a:t>.</a:t>
+            </a:r>
             <a:endParaRPr lang="es-ES" dirty="0"/>
           </a:p>
         </p:txBody>
@@ -7911,11 +8394,7 @@
             </a:r>
             <a:r>
               <a:rPr lang="es-ES" dirty="0" smtClean="0"/>
-              <a:t> de prueba (</a:t>
-            </a:r>
-            <a:r>
-              <a:rPr lang="es-ES" dirty="0" smtClean="0"/>
-              <a:t>VI)</a:t>
+              <a:t> de prueba (VI)</a:t>
             </a:r>
             <a:endParaRPr lang="es-ES" dirty="0"/>
           </a:p>
@@ -7931,15 +8410,215 @@
             <p:ph sz="quarter" idx="1"/>
           </p:nvPr>
         </p:nvSpPr>
-        <p:spPr/>
+        <p:spPr>
+          <a:xfrm>
+            <a:off x="457200" y="1600200"/>
+            <a:ext cx="7859216" cy="4997152"/>
+          </a:xfrm>
+        </p:spPr>
         <p:txBody>
           <a:bodyPr/>
           <a:lstStyle/>
           <a:p>
-            <a:endParaRPr lang="es-ES"/>
-          </a:p>
-        </p:txBody>
-      </p:sp>
+            <a:pPr lvl="1"/>
+            <a:r>
+              <a:rPr lang="es-ES" dirty="0" smtClean="0"/>
+              <a:t>Modificaciones en </a:t>
+            </a:r>
+            <a:r>
+              <a:rPr lang="es-ES" dirty="0" err="1" smtClean="0"/>
+              <a:t>main</a:t>
+            </a:r>
+            <a:r>
+              <a:rPr lang="es-ES" dirty="0" smtClean="0"/>
+              <a:t> </a:t>
+            </a:r>
+            <a:r>
+              <a:rPr lang="es-ES" dirty="0" err="1" smtClean="0"/>
+              <a:t>src</a:t>
+            </a:r>
+            <a:r>
+              <a:rPr lang="es-ES" dirty="0" smtClean="0"/>
+              <a:t>/MainActivity2.java</a:t>
+            </a:r>
+          </a:p>
+          <a:p>
+            <a:pPr lvl="1"/>
+            <a:endParaRPr lang="es-ES" dirty="0" smtClean="0"/>
+          </a:p>
+          <a:p>
+            <a:pPr lvl="1">
+              <a:buNone/>
+            </a:pPr>
+            <a:r>
+              <a:rPr lang="es-ES" dirty="0" smtClean="0"/>
+              <a:t>…</a:t>
+            </a:r>
+          </a:p>
+          <a:p>
+            <a:pPr lvl="1">
+              <a:buNone/>
+            </a:pPr>
+            <a:endParaRPr lang="es-ES" dirty="0" smtClean="0"/>
+          </a:p>
+          <a:p>
+            <a:pPr lvl="1"/>
+            <a:endParaRPr lang="es-ES" dirty="0" smtClean="0"/>
+          </a:p>
+          <a:p>
+            <a:pPr lvl="1"/>
+            <a:endParaRPr lang="es-ES" dirty="0" smtClean="0"/>
+          </a:p>
+          <a:p>
+            <a:pPr lvl="1"/>
+            <a:endParaRPr lang="es-ES" dirty="0" smtClean="0"/>
+          </a:p>
+          <a:p>
+            <a:pPr lvl="1"/>
+            <a:endParaRPr lang="es-ES" dirty="0" smtClean="0"/>
+          </a:p>
+          <a:p>
+            <a:pPr lvl="1"/>
+            <a:endParaRPr lang="es-ES" dirty="0" smtClean="0"/>
+          </a:p>
+          <a:p>
+            <a:pPr lvl="1"/>
+            <a:endParaRPr lang="es-ES" dirty="0" smtClean="0"/>
+          </a:p>
+          <a:p>
+            <a:pPr lvl="1"/>
+            <a:endParaRPr lang="es-ES" dirty="0" smtClean="0"/>
+          </a:p>
+          <a:p>
+            <a:pPr lvl="1"/>
+            <a:endParaRPr lang="es-ES" dirty="0" smtClean="0"/>
+          </a:p>
+          <a:p>
+            <a:pPr lvl="1">
+              <a:buNone/>
+            </a:pPr>
+            <a:endParaRPr lang="es-ES" dirty="0" smtClean="0"/>
+          </a:p>
+          <a:p>
+            <a:pPr lvl="1">
+              <a:buNone/>
+            </a:pPr>
+            <a:endParaRPr lang="es-ES" dirty="0" smtClean="0"/>
+          </a:p>
+          <a:p>
+            <a:pPr lvl="1">
+              <a:buNone/>
+            </a:pPr>
+            <a:endParaRPr lang="es-ES" dirty="0" smtClean="0"/>
+          </a:p>
+          <a:p>
+            <a:pPr lvl="1">
+              <a:buNone/>
+            </a:pPr>
+            <a:endParaRPr lang="es-ES" dirty="0" smtClean="0"/>
+          </a:p>
+          <a:p>
+            <a:pPr lvl="1">
+              <a:buNone/>
+            </a:pPr>
+            <a:endParaRPr lang="es-ES" dirty="0" smtClean="0"/>
+          </a:p>
+          <a:p>
+            <a:pPr lvl="1">
+              <a:buNone/>
+            </a:pPr>
+            <a:endParaRPr lang="es-ES" dirty="0" smtClean="0"/>
+          </a:p>
+          <a:p>
+            <a:pPr lvl="1">
+              <a:buNone/>
+            </a:pPr>
+            <a:endParaRPr lang="es-ES" dirty="0" smtClean="0"/>
+          </a:p>
+          <a:p>
+            <a:pPr lvl="1">
+              <a:buNone/>
+            </a:pPr>
+            <a:endParaRPr lang="es-ES" dirty="0" smtClean="0"/>
+          </a:p>
+          <a:p>
+            <a:pPr lvl="1">
+              <a:buNone/>
+            </a:pPr>
+            <a:endParaRPr lang="es-ES" dirty="0" smtClean="0"/>
+          </a:p>
+          <a:p>
+            <a:pPr lvl="1">
+              <a:buNone/>
+            </a:pPr>
+            <a:endParaRPr lang="es-ES" dirty="0"/>
+          </a:p>
+        </p:txBody>
+      </p:sp>
+      <p:pic>
+        <p:nvPicPr>
+          <p:cNvPr id="2052" name="Picture 4"/>
+          <p:cNvPicPr>
+            <a:picLocks noChangeAspect="1" noChangeArrowheads="1"/>
+          </p:cNvPicPr>
+          <p:nvPr/>
+        </p:nvPicPr>
+        <p:blipFill>
+          <a:blip r:embed="rId2" cstate="print"/>
+          <a:srcRect/>
+          <a:stretch>
+            <a:fillRect/>
+          </a:stretch>
+        </p:blipFill>
+        <p:spPr bwMode="auto">
+          <a:xfrm>
+            <a:off x="755576" y="2132856"/>
+            <a:ext cx="6305550" cy="304800"/>
+          </a:xfrm>
+          <a:prstGeom prst="rect">
+            <a:avLst/>
+          </a:prstGeom>
+          <a:noFill/>
+          <a:ln w="9525">
+            <a:noFill/>
+            <a:miter lim="800000"/>
+            <a:headEnd/>
+            <a:tailEnd/>
+          </a:ln>
+        </p:spPr>
+      </p:pic>
+      <p:pic>
+        <p:nvPicPr>
+          <p:cNvPr id="2054" name="Picture 6"/>
+          <p:cNvPicPr>
+            <a:picLocks noChangeAspect="1" noChangeArrowheads="1"/>
+          </p:cNvPicPr>
+          <p:nvPr/>
+        </p:nvPicPr>
+        <p:blipFill>
+          <a:blip r:embed="rId3" cstate="print"/>
+          <a:srcRect/>
+          <a:stretch>
+            <a:fillRect/>
+          </a:stretch>
+        </p:blipFill>
+        <p:spPr bwMode="auto">
+          <a:xfrm>
+            <a:off x="827584" y="2708920"/>
+            <a:ext cx="7086600" cy="3438525"/>
+          </a:xfrm>
+          <a:prstGeom prst="rect">
+            <a:avLst/>
+          </a:prstGeom>
+          <a:noFill/>
+          <a:ln w="9525">
+            <a:noFill/>
+            <a:miter lim="800000"/>
+            <a:headEnd/>
+            <a:tailEnd/>
+          </a:ln>
+        </p:spPr>
+      </p:pic>
     </p:spTree>
   </p:cSld>
   <p:clrMapOvr>

</xml_diff>